<commit_message>
vis driven criteria adjust, and median vs mean trace
</commit_message>
<xml_diff>
--- a/results/tuning curve bias san check/TC.pptx
+++ b/results/tuning curve bias san check/TC.pptx
@@ -7,6 +7,13 @@
   <p:sldIdLst>
     <p:sldId id="256" r:id="rId2"/>
     <p:sldId id="257" r:id="rId3"/>
+    <p:sldId id="263" r:id="rId4"/>
+    <p:sldId id="258" r:id="rId5"/>
+    <p:sldId id="262" r:id="rId6"/>
+    <p:sldId id="259" r:id="rId7"/>
+    <p:sldId id="260" r:id="rId8"/>
+    <p:sldId id="261" r:id="rId9"/>
+    <p:sldId id="264" r:id="rId10"/>
   </p:sldIdLst>
   <p:sldSz cx="12192000" cy="6858000"/>
   <p:notesSz cx="6858000" cy="9144000"/>
@@ -105,6 +112,11 @@
       </a:defRPr>
     </a:lvl9pPr>
   </p:defaultTextStyle>
+  <p:extLst>
+    <p:ext uri="{EFAFB233-063F-42B5-8137-9DF3F51BA10A}">
+      <p15:sldGuideLst xmlns:p15="http://schemas.microsoft.com/office/powerpoint/2012/main"/>
+    </p:ext>
+  </p:extLst>
 </p:presentation>
 </file>
 
@@ -255,7 +267,7 @@
           <a:p>
             <a:fld id="{6E4F3E9B-FD2B-4199-9DEF-DC56ADED6631}" type="datetimeFigureOut">
               <a:rPr lang="en-US" smtClean="0"/>
-              <a:t>6/5/2023</a:t>
+              <a:t>6/7/2023</a:t>
             </a:fld>
             <a:endParaRPr lang="en-US"/>
           </a:p>
@@ -453,7 +465,7 @@
           <a:p>
             <a:fld id="{6E4F3E9B-FD2B-4199-9DEF-DC56ADED6631}" type="datetimeFigureOut">
               <a:rPr lang="en-US" smtClean="0"/>
-              <a:t>6/5/2023</a:t>
+              <a:t>6/7/2023</a:t>
             </a:fld>
             <a:endParaRPr lang="en-US"/>
           </a:p>
@@ -661,7 +673,7 @@
           <a:p>
             <a:fld id="{6E4F3E9B-FD2B-4199-9DEF-DC56ADED6631}" type="datetimeFigureOut">
               <a:rPr lang="en-US" smtClean="0"/>
-              <a:t>6/5/2023</a:t>
+              <a:t>6/7/2023</a:t>
             </a:fld>
             <a:endParaRPr lang="en-US"/>
           </a:p>
@@ -859,7 +871,7 @@
           <a:p>
             <a:fld id="{6E4F3E9B-FD2B-4199-9DEF-DC56ADED6631}" type="datetimeFigureOut">
               <a:rPr lang="en-US" smtClean="0"/>
-              <a:t>6/5/2023</a:t>
+              <a:t>6/7/2023</a:t>
             </a:fld>
             <a:endParaRPr lang="en-US"/>
           </a:p>
@@ -1134,7 +1146,7 @@
           <a:p>
             <a:fld id="{6E4F3E9B-FD2B-4199-9DEF-DC56ADED6631}" type="datetimeFigureOut">
               <a:rPr lang="en-US" smtClean="0"/>
-              <a:t>6/5/2023</a:t>
+              <a:t>6/7/2023</a:t>
             </a:fld>
             <a:endParaRPr lang="en-US"/>
           </a:p>
@@ -1399,7 +1411,7 @@
           <a:p>
             <a:fld id="{6E4F3E9B-FD2B-4199-9DEF-DC56ADED6631}" type="datetimeFigureOut">
               <a:rPr lang="en-US" smtClean="0"/>
-              <a:t>6/5/2023</a:t>
+              <a:t>6/7/2023</a:t>
             </a:fld>
             <a:endParaRPr lang="en-US"/>
           </a:p>
@@ -1811,7 +1823,7 @@
           <a:p>
             <a:fld id="{6E4F3E9B-FD2B-4199-9DEF-DC56ADED6631}" type="datetimeFigureOut">
               <a:rPr lang="en-US" smtClean="0"/>
-              <a:t>6/5/2023</a:t>
+              <a:t>6/7/2023</a:t>
             </a:fld>
             <a:endParaRPr lang="en-US"/>
           </a:p>
@@ -1952,7 +1964,7 @@
           <a:p>
             <a:fld id="{6E4F3E9B-FD2B-4199-9DEF-DC56ADED6631}" type="datetimeFigureOut">
               <a:rPr lang="en-US" smtClean="0"/>
-              <a:t>6/5/2023</a:t>
+              <a:t>6/7/2023</a:t>
             </a:fld>
             <a:endParaRPr lang="en-US"/>
           </a:p>
@@ -2065,7 +2077,7 @@
           <a:p>
             <a:fld id="{6E4F3E9B-FD2B-4199-9DEF-DC56ADED6631}" type="datetimeFigureOut">
               <a:rPr lang="en-US" smtClean="0"/>
-              <a:t>6/5/2023</a:t>
+              <a:t>6/7/2023</a:t>
             </a:fld>
             <a:endParaRPr lang="en-US"/>
           </a:p>
@@ -2376,7 +2388,7 @@
           <a:p>
             <a:fld id="{6E4F3E9B-FD2B-4199-9DEF-DC56ADED6631}" type="datetimeFigureOut">
               <a:rPr lang="en-US" smtClean="0"/>
-              <a:t>6/5/2023</a:t>
+              <a:t>6/7/2023</a:t>
             </a:fld>
             <a:endParaRPr lang="en-US"/>
           </a:p>
@@ -2664,7 +2676,7 @@
           <a:p>
             <a:fld id="{6E4F3E9B-FD2B-4199-9DEF-DC56ADED6631}" type="datetimeFigureOut">
               <a:rPr lang="en-US" smtClean="0"/>
-              <a:t>6/5/2023</a:t>
+              <a:t>6/7/2023</a:t>
             </a:fld>
             <a:endParaRPr lang="en-US"/>
           </a:p>
@@ -2905,7 +2917,7 @@
           <a:p>
             <a:fld id="{6E4F3E9B-FD2B-4199-9DEF-DC56ADED6631}" type="datetimeFigureOut">
               <a:rPr lang="en-US" smtClean="0"/>
-              <a:t>6/5/2023</a:t>
+              <a:t>6/7/2023</a:t>
             </a:fld>
             <a:endParaRPr lang="en-US"/>
           </a:p>
@@ -3661,6 +3673,1114 @@
 </p:sld>
 </file>
 
+<file path=ppt/slides/slide3.xml><?xml version="1.0" encoding="utf-8"?>
+<p:sld xmlns:a="http://schemas.openxmlformats.org/drawingml/2006/main" xmlns:r="http://schemas.openxmlformats.org/officeDocument/2006/relationships" xmlns:p="http://schemas.openxmlformats.org/presentationml/2006/main">
+  <p:cSld>
+    <p:spTree>
+      <p:nvGrpSpPr>
+        <p:cNvPr id="1" name=""/>
+        <p:cNvGrpSpPr/>
+        <p:nvPr/>
+      </p:nvGrpSpPr>
+      <p:grpSpPr>
+        <a:xfrm>
+          <a:off x="0" y="0"/>
+          <a:ext cx="0" cy="0"/>
+          <a:chOff x="0" y="0"/>
+          <a:chExt cx="0" cy="0"/>
+        </a:xfrm>
+      </p:grpSpPr>
+      <p:sp>
+        <p:nvSpPr>
+          <p:cNvPr id="2" name="Title 1">
+            <a:extLst>
+              <a:ext uri="{FF2B5EF4-FFF2-40B4-BE49-F238E27FC236}">
+                <a16:creationId xmlns:a16="http://schemas.microsoft.com/office/drawing/2014/main" id="{6540E571-B62C-4FA7-9B20-673AC6B3D021}"/>
+              </a:ext>
+            </a:extLst>
+          </p:cNvPr>
+          <p:cNvSpPr>
+            <a:spLocks noGrp="1"/>
+          </p:cNvSpPr>
+          <p:nvPr>
+            <p:ph type="title"/>
+          </p:nvPr>
+        </p:nvSpPr>
+        <p:spPr/>
+        <p:txBody>
+          <a:bodyPr/>
+          <a:lstStyle/>
+          <a:p>
+            <a:r>
+              <a:rPr lang="en-US"/>
+              <a:t>New vis driven criteria</a:t>
+            </a:r>
+          </a:p>
+        </p:txBody>
+      </p:sp>
+      <p:sp>
+        <p:nvSpPr>
+          <p:cNvPr id="3" name="Content Placeholder 2">
+            <a:extLst>
+              <a:ext uri="{FF2B5EF4-FFF2-40B4-BE49-F238E27FC236}">
+                <a16:creationId xmlns:a16="http://schemas.microsoft.com/office/drawing/2014/main" id="{627323E7-3E77-4B77-B286-91076B4BC367}"/>
+              </a:ext>
+            </a:extLst>
+          </p:cNvPr>
+          <p:cNvSpPr>
+            <a:spLocks noGrp="1"/>
+          </p:cNvSpPr>
+          <p:nvPr>
+            <p:ph idx="1"/>
+          </p:nvPr>
+        </p:nvSpPr>
+        <p:spPr/>
+        <p:txBody>
+          <a:bodyPr/>
+          <a:lstStyle/>
+          <a:p>
+            <a:r>
+              <a:rPr lang="en-US"/>
+              <a:t>changed to: driven by any image (pass t-test to any stim2, but with bonferroni correction) AND amp threshold. </a:t>
+            </a:r>
+          </a:p>
+          <a:p>
+            <a:r>
+              <a:rPr lang="en-US"/>
+              <a:t>p_bonferroni_corrected = p_sig / nstim</a:t>
+            </a:r>
+          </a:p>
+          <a:p>
+            <a:r>
+              <a:rPr lang="en-US"/>
+              <a:t>Too few cells being classified as visually driven when p_sig = 0.05, had to raise p_sig acc. to Yuansi’s suggestion</a:t>
+            </a:r>
+          </a:p>
+        </p:txBody>
+      </p:sp>
+    </p:spTree>
+    <p:extLst>
+      <p:ext uri="{BB962C8B-B14F-4D97-AF65-F5344CB8AC3E}">
+        <p14:creationId xmlns:p14="http://schemas.microsoft.com/office/powerpoint/2010/main" val="3812877666"/>
+      </p:ext>
+    </p:extLst>
+  </p:cSld>
+  <p:clrMapOvr>
+    <a:masterClrMapping/>
+  </p:clrMapOvr>
+</p:sld>
+</file>
+
+<file path=ppt/slides/slide4.xml><?xml version="1.0" encoding="utf-8"?>
+<p:sld xmlns:a="http://schemas.openxmlformats.org/drawingml/2006/main" xmlns:r="http://schemas.openxmlformats.org/officeDocument/2006/relationships" xmlns:p="http://schemas.openxmlformats.org/presentationml/2006/main">
+  <p:cSld>
+    <p:spTree>
+      <p:nvGrpSpPr>
+        <p:cNvPr id="1" name=""/>
+        <p:cNvGrpSpPr/>
+        <p:nvPr/>
+      </p:nvGrpSpPr>
+      <p:grpSpPr>
+        <a:xfrm>
+          <a:off x="0" y="0"/>
+          <a:ext cx="0" cy="0"/>
+          <a:chOff x="0" y="0"/>
+          <a:chExt cx="0" cy="0"/>
+        </a:xfrm>
+      </p:grpSpPr>
+      <p:sp>
+        <p:nvSpPr>
+          <p:cNvPr id="2" name="Title 1">
+            <a:extLst>
+              <a:ext uri="{FF2B5EF4-FFF2-40B4-BE49-F238E27FC236}">
+                <a16:creationId xmlns:a16="http://schemas.microsoft.com/office/drawing/2014/main" id="{ECE5149C-25F0-403B-A613-AE559D916A2B}"/>
+              </a:ext>
+            </a:extLst>
+          </p:cNvPr>
+          <p:cNvSpPr>
+            <a:spLocks noGrp="1"/>
+          </p:cNvSpPr>
+          <p:nvPr>
+            <p:ph type="title"/>
+          </p:nvPr>
+        </p:nvSpPr>
+        <p:spPr/>
+        <p:txBody>
+          <a:bodyPr/>
+          <a:lstStyle/>
+          <a:p>
+            <a:r>
+              <a:rPr lang="en-US"/>
+              <a:t>New vis driven criteria</a:t>
+            </a:r>
+          </a:p>
+        </p:txBody>
+      </p:sp>
+      <p:sp>
+        <p:nvSpPr>
+          <p:cNvPr id="3" name="Text Placeholder 2">
+            <a:extLst>
+              <a:ext uri="{FF2B5EF4-FFF2-40B4-BE49-F238E27FC236}">
+                <a16:creationId xmlns:a16="http://schemas.microsoft.com/office/drawing/2014/main" id="{4AD3190E-522F-4A2F-B7FC-176B1E512385}"/>
+              </a:ext>
+            </a:extLst>
+          </p:cNvPr>
+          <p:cNvSpPr>
+            <a:spLocks noGrp="1"/>
+          </p:cNvSpPr>
+          <p:nvPr>
+            <p:ph type="body" idx="1"/>
+          </p:nvPr>
+        </p:nvSpPr>
+        <p:spPr/>
+        <p:txBody>
+          <a:bodyPr/>
+          <a:lstStyle/>
+          <a:p>
+            <a:r>
+              <a:rPr lang="en-US"/>
+              <a:t>New vis cells</a:t>
+            </a:r>
+          </a:p>
+        </p:txBody>
+      </p:sp>
+      <p:pic>
+        <p:nvPicPr>
+          <p:cNvPr id="8" name="Content Placeholder 7">
+            <a:extLst>
+              <a:ext uri="{FF2B5EF4-FFF2-40B4-BE49-F238E27FC236}">
+                <a16:creationId xmlns:a16="http://schemas.microsoft.com/office/drawing/2014/main" id="{6B07BA0A-2B96-4391-9CE5-1820DD938DA0}"/>
+              </a:ext>
+            </a:extLst>
+          </p:cNvPr>
+          <p:cNvPicPr>
+            <a:picLocks noGrp="1" noChangeAspect="1"/>
+          </p:cNvPicPr>
+          <p:nvPr>
+            <p:ph sz="half" idx="2"/>
+          </p:nvPr>
+        </p:nvPicPr>
+        <p:blipFill>
+          <a:blip r:embed="rId2"/>
+          <a:stretch>
+            <a:fillRect/>
+          </a:stretch>
+        </p:blipFill>
+        <p:spPr>
+          <a:xfrm>
+            <a:off x="1232909" y="2505075"/>
+            <a:ext cx="4371544" cy="3684588"/>
+          </a:xfrm>
+          <a:prstGeom prst="rect">
+            <a:avLst/>
+          </a:prstGeom>
+        </p:spPr>
+      </p:pic>
+      <p:sp>
+        <p:nvSpPr>
+          <p:cNvPr id="5" name="Text Placeholder 4">
+            <a:extLst>
+              <a:ext uri="{FF2B5EF4-FFF2-40B4-BE49-F238E27FC236}">
+                <a16:creationId xmlns:a16="http://schemas.microsoft.com/office/drawing/2014/main" id="{CD2BBD8F-A4C4-4D45-82D4-9003DEDEE4E7}"/>
+              </a:ext>
+            </a:extLst>
+          </p:cNvPr>
+          <p:cNvSpPr>
+            <a:spLocks noGrp="1"/>
+          </p:cNvSpPr>
+          <p:nvPr>
+            <p:ph type="body" sz="quarter" idx="3"/>
+          </p:nvPr>
+        </p:nvSpPr>
+        <p:spPr/>
+        <p:txBody>
+          <a:bodyPr/>
+          <a:lstStyle/>
+          <a:p>
+            <a:r>
+              <a:rPr lang="en-US"/>
+              <a:t>(Old) vis cells</a:t>
+            </a:r>
+          </a:p>
+        </p:txBody>
+      </p:sp>
+      <p:pic>
+        <p:nvPicPr>
+          <p:cNvPr id="7" name="Content Placeholder 7">
+            <a:extLst>
+              <a:ext uri="{FF2B5EF4-FFF2-40B4-BE49-F238E27FC236}">
+                <a16:creationId xmlns:a16="http://schemas.microsoft.com/office/drawing/2014/main" id="{C4D26263-CE72-4412-8AB5-C008A4A068D8}"/>
+              </a:ext>
+            </a:extLst>
+          </p:cNvPr>
+          <p:cNvPicPr>
+            <a:picLocks noGrp="1" noChangeAspect="1"/>
+          </p:cNvPicPr>
+          <p:nvPr>
+            <p:ph sz="quarter" idx="4"/>
+          </p:nvPr>
+        </p:nvPicPr>
+        <p:blipFill>
+          <a:blip r:embed="rId3"/>
+          <a:stretch>
+            <a:fillRect/>
+          </a:stretch>
+        </p:blipFill>
+        <p:spPr>
+          <a:xfrm>
+            <a:off x="6578022" y="2505075"/>
+            <a:ext cx="4371544" cy="3684588"/>
+          </a:xfrm>
+          <a:prstGeom prst="rect">
+            <a:avLst/>
+          </a:prstGeom>
+        </p:spPr>
+      </p:pic>
+      <p:pic>
+        <p:nvPicPr>
+          <p:cNvPr id="9" name="Picture 8">
+            <a:extLst>
+              <a:ext uri="{FF2B5EF4-FFF2-40B4-BE49-F238E27FC236}">
+                <a16:creationId xmlns:a16="http://schemas.microsoft.com/office/drawing/2014/main" id="{EB7E093A-E40A-4D5E-BA65-EBCF192AF0D6}"/>
+              </a:ext>
+            </a:extLst>
+          </p:cNvPr>
+          <p:cNvPicPr>
+            <a:picLocks noChangeAspect="1"/>
+          </p:cNvPicPr>
+          <p:nvPr/>
+        </p:nvPicPr>
+        <p:blipFill>
+          <a:blip r:embed="rId4"/>
+          <a:stretch>
+            <a:fillRect/>
+          </a:stretch>
+        </p:blipFill>
+        <p:spPr>
+          <a:xfrm>
+            <a:off x="8342019" y="58403"/>
+            <a:ext cx="3688400" cy="2034716"/>
+          </a:xfrm>
+          <a:prstGeom prst="rect">
+            <a:avLst/>
+          </a:prstGeom>
+        </p:spPr>
+      </p:pic>
+    </p:spTree>
+    <p:extLst>
+      <p:ext uri="{BB962C8B-B14F-4D97-AF65-F5344CB8AC3E}">
+        <p14:creationId xmlns:p14="http://schemas.microsoft.com/office/powerpoint/2010/main" val="3244092528"/>
+      </p:ext>
+    </p:extLst>
+  </p:cSld>
+  <p:clrMapOvr>
+    <a:masterClrMapping/>
+  </p:clrMapOvr>
+</p:sld>
+</file>
+
+<file path=ppt/slides/slide5.xml><?xml version="1.0" encoding="utf-8"?>
+<p:sld xmlns:a="http://schemas.openxmlformats.org/drawingml/2006/main" xmlns:r="http://schemas.openxmlformats.org/officeDocument/2006/relationships" xmlns:p="http://schemas.openxmlformats.org/presentationml/2006/main">
+  <p:cSld>
+    <p:spTree>
+      <p:nvGrpSpPr>
+        <p:cNvPr id="1" name=""/>
+        <p:cNvGrpSpPr/>
+        <p:nvPr/>
+      </p:nvGrpSpPr>
+      <p:grpSpPr>
+        <a:xfrm>
+          <a:off x="0" y="0"/>
+          <a:ext cx="0" cy="0"/>
+          <a:chOff x="0" y="0"/>
+          <a:chExt cx="0" cy="0"/>
+        </a:xfrm>
+      </p:grpSpPr>
+      <p:sp>
+        <p:nvSpPr>
+          <p:cNvPr id="2" name="Title 1">
+            <a:extLst>
+              <a:ext uri="{FF2B5EF4-FFF2-40B4-BE49-F238E27FC236}">
+                <a16:creationId xmlns:a16="http://schemas.microsoft.com/office/drawing/2014/main" id="{645F7AFD-B6F3-4B8B-8EBF-523972C0144F}"/>
+              </a:ext>
+            </a:extLst>
+          </p:cNvPr>
+          <p:cNvSpPr>
+            <a:spLocks noGrp="1"/>
+          </p:cNvSpPr>
+          <p:nvPr>
+            <p:ph type="title"/>
+          </p:nvPr>
+        </p:nvSpPr>
+        <p:spPr/>
+        <p:txBody>
+          <a:bodyPr/>
+          <a:lstStyle/>
+          <a:p>
+            <a:r>
+              <a:rPr lang="en-US"/>
+              <a:t>New vis driven criteria</a:t>
+            </a:r>
+          </a:p>
+        </p:txBody>
+      </p:sp>
+      <p:sp>
+        <p:nvSpPr>
+          <p:cNvPr id="3" name="Text Placeholder 2">
+            <a:extLst>
+              <a:ext uri="{FF2B5EF4-FFF2-40B4-BE49-F238E27FC236}">
+                <a16:creationId xmlns:a16="http://schemas.microsoft.com/office/drawing/2014/main" id="{FB02C03C-D7B5-4853-95A0-CAFC3D67821F}"/>
+              </a:ext>
+            </a:extLst>
+          </p:cNvPr>
+          <p:cNvSpPr>
+            <a:spLocks noGrp="1"/>
+          </p:cNvSpPr>
+          <p:nvPr>
+            <p:ph type="body" idx="1"/>
+          </p:nvPr>
+        </p:nvSpPr>
+        <p:spPr/>
+        <p:txBody>
+          <a:bodyPr/>
+          <a:lstStyle/>
+          <a:p>
+            <a:r>
+              <a:rPr lang="en-US"/>
+              <a:t>Mean trace, new not-vis cells</a:t>
+            </a:r>
+          </a:p>
+        </p:txBody>
+      </p:sp>
+      <p:pic>
+        <p:nvPicPr>
+          <p:cNvPr id="8" name="Content Placeholder 7">
+            <a:extLst>
+              <a:ext uri="{FF2B5EF4-FFF2-40B4-BE49-F238E27FC236}">
+                <a16:creationId xmlns:a16="http://schemas.microsoft.com/office/drawing/2014/main" id="{EDFC5A59-1557-4611-8513-5AD6B0D18946}"/>
+              </a:ext>
+            </a:extLst>
+          </p:cNvPr>
+          <p:cNvPicPr>
+            <a:picLocks noGrp="1" noChangeAspect="1"/>
+          </p:cNvPicPr>
+          <p:nvPr>
+            <p:ph sz="half" idx="2"/>
+          </p:nvPr>
+        </p:nvPicPr>
+        <p:blipFill>
+          <a:blip r:embed="rId2"/>
+          <a:stretch>
+            <a:fillRect/>
+          </a:stretch>
+        </p:blipFill>
+        <p:spPr>
+          <a:xfrm>
+            <a:off x="1232909" y="2505075"/>
+            <a:ext cx="4371544" cy="3684588"/>
+          </a:xfrm>
+          <a:prstGeom prst="rect">
+            <a:avLst/>
+          </a:prstGeom>
+        </p:spPr>
+      </p:pic>
+      <p:sp>
+        <p:nvSpPr>
+          <p:cNvPr id="5" name="Text Placeholder 4">
+            <a:extLst>
+              <a:ext uri="{FF2B5EF4-FFF2-40B4-BE49-F238E27FC236}">
+                <a16:creationId xmlns:a16="http://schemas.microsoft.com/office/drawing/2014/main" id="{3C62652D-6051-43C6-A4BC-F992C2D107AC}"/>
+              </a:ext>
+            </a:extLst>
+          </p:cNvPr>
+          <p:cNvSpPr>
+            <a:spLocks noGrp="1"/>
+          </p:cNvSpPr>
+          <p:nvPr>
+            <p:ph type="body" sz="quarter" idx="3"/>
+          </p:nvPr>
+        </p:nvSpPr>
+        <p:spPr/>
+        <p:txBody>
+          <a:bodyPr/>
+          <a:lstStyle/>
+          <a:p>
+            <a:r>
+              <a:rPr lang="en-US"/>
+              <a:t>Mean trace, new vis cells</a:t>
+            </a:r>
+          </a:p>
+        </p:txBody>
+      </p:sp>
+      <p:pic>
+        <p:nvPicPr>
+          <p:cNvPr id="7" name="Content Placeholder 7">
+            <a:extLst>
+              <a:ext uri="{FF2B5EF4-FFF2-40B4-BE49-F238E27FC236}">
+                <a16:creationId xmlns:a16="http://schemas.microsoft.com/office/drawing/2014/main" id="{7180745C-7B1B-4CF0-A333-864CDCB70A8A}"/>
+              </a:ext>
+            </a:extLst>
+          </p:cNvPr>
+          <p:cNvPicPr>
+            <a:picLocks noGrp="1" noChangeAspect="1"/>
+          </p:cNvPicPr>
+          <p:nvPr>
+            <p:ph sz="quarter" idx="4"/>
+          </p:nvPr>
+        </p:nvPicPr>
+        <p:blipFill>
+          <a:blip r:embed="rId3"/>
+          <a:stretch>
+            <a:fillRect/>
+          </a:stretch>
+        </p:blipFill>
+        <p:spPr>
+          <a:xfrm>
+            <a:off x="6578022" y="2505075"/>
+            <a:ext cx="4371544" cy="3684588"/>
+          </a:xfrm>
+          <a:prstGeom prst="rect">
+            <a:avLst/>
+          </a:prstGeom>
+        </p:spPr>
+      </p:pic>
+    </p:spTree>
+    <p:extLst>
+      <p:ext uri="{BB962C8B-B14F-4D97-AF65-F5344CB8AC3E}">
+        <p14:creationId xmlns:p14="http://schemas.microsoft.com/office/powerpoint/2010/main" val="3848968475"/>
+      </p:ext>
+    </p:extLst>
+  </p:cSld>
+  <p:clrMapOvr>
+    <a:masterClrMapping/>
+  </p:clrMapOvr>
+</p:sld>
+</file>
+
+<file path=ppt/slides/slide6.xml><?xml version="1.0" encoding="utf-8"?>
+<p:sld xmlns:a="http://schemas.openxmlformats.org/drawingml/2006/main" xmlns:r="http://schemas.openxmlformats.org/officeDocument/2006/relationships" xmlns:p="http://schemas.openxmlformats.org/presentationml/2006/main">
+  <p:cSld>
+    <p:spTree>
+      <p:nvGrpSpPr>
+        <p:cNvPr id="1" name=""/>
+        <p:cNvGrpSpPr/>
+        <p:nvPr/>
+      </p:nvGrpSpPr>
+      <p:grpSpPr>
+        <a:xfrm>
+          <a:off x="0" y="0"/>
+          <a:ext cx="0" cy="0"/>
+          <a:chOff x="0" y="0"/>
+          <a:chExt cx="0" cy="0"/>
+        </a:xfrm>
+      </p:grpSpPr>
+      <p:sp>
+        <p:nvSpPr>
+          <p:cNvPr id="7" name="Title 6">
+            <a:extLst>
+              <a:ext uri="{FF2B5EF4-FFF2-40B4-BE49-F238E27FC236}">
+                <a16:creationId xmlns:a16="http://schemas.microsoft.com/office/drawing/2014/main" id="{01973BFF-80A3-4CBE-8198-24B02D5A5906}"/>
+              </a:ext>
+            </a:extLst>
+          </p:cNvPr>
+          <p:cNvSpPr>
+            <a:spLocks noGrp="1"/>
+          </p:cNvSpPr>
+          <p:nvPr>
+            <p:ph type="title"/>
+          </p:nvPr>
+        </p:nvSpPr>
+        <p:spPr/>
+        <p:txBody>
+          <a:bodyPr/>
+          <a:lstStyle/>
+          <a:p>
+            <a:r>
+              <a:rPr lang="en-US"/>
+              <a:t>Outlier of response (ncell x ntrial) -&gt; take median?</a:t>
+            </a:r>
+          </a:p>
+        </p:txBody>
+      </p:sp>
+      <p:pic>
+        <p:nvPicPr>
+          <p:cNvPr id="9" name="Content Placeholder 8">
+            <a:extLst>
+              <a:ext uri="{FF2B5EF4-FFF2-40B4-BE49-F238E27FC236}">
+                <a16:creationId xmlns:a16="http://schemas.microsoft.com/office/drawing/2014/main" id="{D2BD97D6-D0BE-479A-ABC5-9A3994075FDF}"/>
+              </a:ext>
+            </a:extLst>
+          </p:cNvPr>
+          <p:cNvPicPr>
+            <a:picLocks noGrp="1" noChangeAspect="1"/>
+          </p:cNvPicPr>
+          <p:nvPr>
+            <p:ph idx="1"/>
+          </p:nvPr>
+        </p:nvPicPr>
+        <p:blipFill>
+          <a:blip r:embed="rId2"/>
+          <a:stretch>
+            <a:fillRect/>
+          </a:stretch>
+        </p:blipFill>
+        <p:spPr>
+          <a:xfrm>
+            <a:off x="1922889" y="1825625"/>
+            <a:ext cx="8346222" cy="4351338"/>
+          </a:xfrm>
+          <a:prstGeom prst="rect">
+            <a:avLst/>
+          </a:prstGeom>
+        </p:spPr>
+      </p:pic>
+    </p:spTree>
+    <p:extLst>
+      <p:ext uri="{BB962C8B-B14F-4D97-AF65-F5344CB8AC3E}">
+        <p14:creationId xmlns:p14="http://schemas.microsoft.com/office/powerpoint/2010/main" val="3379037494"/>
+      </p:ext>
+    </p:extLst>
+  </p:cSld>
+  <p:clrMapOvr>
+    <a:masterClrMapping/>
+  </p:clrMapOvr>
+</p:sld>
+</file>
+
+<file path=ppt/slides/slide7.xml><?xml version="1.0" encoding="utf-8"?>
+<p:sld xmlns:a="http://schemas.openxmlformats.org/drawingml/2006/main" xmlns:r="http://schemas.openxmlformats.org/officeDocument/2006/relationships" xmlns:p="http://schemas.openxmlformats.org/presentationml/2006/main">
+  <p:cSld>
+    <p:spTree>
+      <p:nvGrpSpPr>
+        <p:cNvPr id="1" name=""/>
+        <p:cNvGrpSpPr/>
+        <p:nvPr/>
+      </p:nvGrpSpPr>
+      <p:grpSpPr>
+        <a:xfrm>
+          <a:off x="0" y="0"/>
+          <a:ext cx="0" cy="0"/>
+          <a:chOff x="0" y="0"/>
+          <a:chExt cx="0" cy="0"/>
+        </a:xfrm>
+      </p:grpSpPr>
+      <p:sp>
+        <p:nvSpPr>
+          <p:cNvPr id="2" name="Title 1">
+            <a:extLst>
+              <a:ext uri="{FF2B5EF4-FFF2-40B4-BE49-F238E27FC236}">
+                <a16:creationId xmlns:a16="http://schemas.microsoft.com/office/drawing/2014/main" id="{7EB8E3DA-AEAD-4170-BD37-60815BEF73EB}"/>
+              </a:ext>
+            </a:extLst>
+          </p:cNvPr>
+          <p:cNvSpPr>
+            <a:spLocks noGrp="1"/>
+          </p:cNvSpPr>
+          <p:nvPr>
+            <p:ph type="title"/>
+          </p:nvPr>
+        </p:nvSpPr>
+        <p:spPr/>
+        <p:txBody>
+          <a:bodyPr/>
+          <a:lstStyle/>
+          <a:p>
+            <a:r>
+              <a:rPr lang="en-US"/>
+              <a:t>Median vs mean trace</a:t>
+            </a:r>
+          </a:p>
+        </p:txBody>
+      </p:sp>
+      <p:sp>
+        <p:nvSpPr>
+          <p:cNvPr id="3" name="Text Placeholder 2">
+            <a:extLst>
+              <a:ext uri="{FF2B5EF4-FFF2-40B4-BE49-F238E27FC236}">
+                <a16:creationId xmlns:a16="http://schemas.microsoft.com/office/drawing/2014/main" id="{82079778-8AA3-4412-9942-806F4ED08AB8}"/>
+              </a:ext>
+            </a:extLst>
+          </p:cNvPr>
+          <p:cNvSpPr>
+            <a:spLocks noGrp="1"/>
+          </p:cNvSpPr>
+          <p:nvPr>
+            <p:ph type="body" idx="1"/>
+          </p:nvPr>
+        </p:nvSpPr>
+        <p:spPr/>
+        <p:txBody>
+          <a:bodyPr/>
+          <a:lstStyle/>
+          <a:p>
+            <a:r>
+              <a:rPr lang="en-US"/>
+              <a:t>Median trace, new vis cells</a:t>
+            </a:r>
+          </a:p>
+        </p:txBody>
+      </p:sp>
+      <p:pic>
+        <p:nvPicPr>
+          <p:cNvPr id="7" name="Content Placeholder 6">
+            <a:extLst>
+              <a:ext uri="{FF2B5EF4-FFF2-40B4-BE49-F238E27FC236}">
+                <a16:creationId xmlns:a16="http://schemas.microsoft.com/office/drawing/2014/main" id="{F0FB4F57-8EB4-4C62-935A-B1FB678B398B}"/>
+              </a:ext>
+            </a:extLst>
+          </p:cNvPr>
+          <p:cNvPicPr>
+            <a:picLocks noGrp="1" noChangeAspect="1"/>
+          </p:cNvPicPr>
+          <p:nvPr>
+            <p:ph sz="half" idx="2"/>
+          </p:nvPr>
+        </p:nvPicPr>
+        <p:blipFill>
+          <a:blip r:embed="rId2"/>
+          <a:stretch>
+            <a:fillRect/>
+          </a:stretch>
+        </p:blipFill>
+        <p:spPr>
+          <a:xfrm>
+            <a:off x="1232909" y="2505075"/>
+            <a:ext cx="4371544" cy="3684588"/>
+          </a:xfrm>
+          <a:prstGeom prst="rect">
+            <a:avLst/>
+          </a:prstGeom>
+        </p:spPr>
+      </p:pic>
+      <p:sp>
+        <p:nvSpPr>
+          <p:cNvPr id="5" name="Text Placeholder 4">
+            <a:extLst>
+              <a:ext uri="{FF2B5EF4-FFF2-40B4-BE49-F238E27FC236}">
+                <a16:creationId xmlns:a16="http://schemas.microsoft.com/office/drawing/2014/main" id="{60428DFD-7F3F-434E-BEE0-083E9C7AACAC}"/>
+              </a:ext>
+            </a:extLst>
+          </p:cNvPr>
+          <p:cNvSpPr>
+            <a:spLocks noGrp="1"/>
+          </p:cNvSpPr>
+          <p:nvPr>
+            <p:ph type="body" sz="quarter" idx="3"/>
+          </p:nvPr>
+        </p:nvSpPr>
+        <p:spPr/>
+        <p:txBody>
+          <a:bodyPr/>
+          <a:lstStyle/>
+          <a:p>
+            <a:r>
+              <a:rPr lang="en-US"/>
+              <a:t>Mean trace, new vis cells</a:t>
+            </a:r>
+          </a:p>
+        </p:txBody>
+      </p:sp>
+      <p:pic>
+        <p:nvPicPr>
+          <p:cNvPr id="8" name="Content Placeholder 7">
+            <a:extLst>
+              <a:ext uri="{FF2B5EF4-FFF2-40B4-BE49-F238E27FC236}">
+                <a16:creationId xmlns:a16="http://schemas.microsoft.com/office/drawing/2014/main" id="{D9393F5C-7864-4840-9C64-30A1D8BBCBA8}"/>
+              </a:ext>
+            </a:extLst>
+          </p:cNvPr>
+          <p:cNvPicPr>
+            <a:picLocks noGrp="1" noChangeAspect="1"/>
+          </p:cNvPicPr>
+          <p:nvPr>
+            <p:ph sz="quarter" idx="4"/>
+          </p:nvPr>
+        </p:nvPicPr>
+        <p:blipFill>
+          <a:blip r:embed="rId3"/>
+          <a:stretch>
+            <a:fillRect/>
+          </a:stretch>
+        </p:blipFill>
+        <p:spPr>
+          <a:xfrm>
+            <a:off x="6578022" y="2505075"/>
+            <a:ext cx="4371544" cy="3684588"/>
+          </a:xfrm>
+          <a:prstGeom prst="rect">
+            <a:avLst/>
+          </a:prstGeom>
+        </p:spPr>
+      </p:pic>
+    </p:spTree>
+    <p:extLst>
+      <p:ext uri="{BB962C8B-B14F-4D97-AF65-F5344CB8AC3E}">
+        <p14:creationId xmlns:p14="http://schemas.microsoft.com/office/powerpoint/2010/main" val="11816102"/>
+      </p:ext>
+    </p:extLst>
+  </p:cSld>
+  <p:clrMapOvr>
+    <a:masterClrMapping/>
+  </p:clrMapOvr>
+</p:sld>
+</file>
+
+<file path=ppt/slides/slide8.xml><?xml version="1.0" encoding="utf-8"?>
+<p:sld xmlns:a="http://schemas.openxmlformats.org/drawingml/2006/main" xmlns:r="http://schemas.openxmlformats.org/officeDocument/2006/relationships" xmlns:p="http://schemas.openxmlformats.org/presentationml/2006/main">
+  <p:cSld>
+    <p:spTree>
+      <p:nvGrpSpPr>
+        <p:cNvPr id="1" name=""/>
+        <p:cNvGrpSpPr/>
+        <p:nvPr/>
+      </p:nvGrpSpPr>
+      <p:grpSpPr>
+        <a:xfrm>
+          <a:off x="0" y="0"/>
+          <a:ext cx="0" cy="0"/>
+          <a:chOff x="0" y="0"/>
+          <a:chExt cx="0" cy="0"/>
+        </a:xfrm>
+      </p:grpSpPr>
+      <p:sp>
+        <p:nvSpPr>
+          <p:cNvPr id="2" name="Title 1">
+            <a:extLst>
+              <a:ext uri="{FF2B5EF4-FFF2-40B4-BE49-F238E27FC236}">
+                <a16:creationId xmlns:a16="http://schemas.microsoft.com/office/drawing/2014/main" id="{DA3A65F3-1DA0-4BBE-95EA-61506F44699E}"/>
+              </a:ext>
+            </a:extLst>
+          </p:cNvPr>
+          <p:cNvSpPr>
+            <a:spLocks noGrp="1"/>
+          </p:cNvSpPr>
+          <p:nvPr>
+            <p:ph type="title"/>
+          </p:nvPr>
+        </p:nvSpPr>
+        <p:spPr/>
+        <p:txBody>
+          <a:bodyPr/>
+          <a:lstStyle/>
+          <a:p>
+            <a:r>
+              <a:rPr lang="en-US"/>
+              <a:t>Median vs mean trace</a:t>
+            </a:r>
+          </a:p>
+        </p:txBody>
+      </p:sp>
+      <p:sp>
+        <p:nvSpPr>
+          <p:cNvPr id="3" name="Text Placeholder 2">
+            <a:extLst>
+              <a:ext uri="{FF2B5EF4-FFF2-40B4-BE49-F238E27FC236}">
+                <a16:creationId xmlns:a16="http://schemas.microsoft.com/office/drawing/2014/main" id="{03800F7F-5FE7-4742-88FB-2F71D781D0E5}"/>
+              </a:ext>
+            </a:extLst>
+          </p:cNvPr>
+          <p:cNvSpPr>
+            <a:spLocks noGrp="1"/>
+          </p:cNvSpPr>
+          <p:nvPr>
+            <p:ph type="body" idx="1"/>
+          </p:nvPr>
+        </p:nvSpPr>
+        <p:spPr/>
+        <p:txBody>
+          <a:bodyPr/>
+          <a:lstStyle/>
+          <a:p>
+            <a:r>
+              <a:rPr lang="en-US"/>
+              <a:t>Median trace, all cells</a:t>
+            </a:r>
+          </a:p>
+        </p:txBody>
+      </p:sp>
+      <p:pic>
+        <p:nvPicPr>
+          <p:cNvPr id="8" name="Content Placeholder 7">
+            <a:extLst>
+              <a:ext uri="{FF2B5EF4-FFF2-40B4-BE49-F238E27FC236}">
+                <a16:creationId xmlns:a16="http://schemas.microsoft.com/office/drawing/2014/main" id="{00A4EE40-77BB-4124-9466-5D62945B02E3}"/>
+              </a:ext>
+            </a:extLst>
+          </p:cNvPr>
+          <p:cNvPicPr>
+            <a:picLocks noGrp="1" noChangeAspect="1"/>
+          </p:cNvPicPr>
+          <p:nvPr>
+            <p:ph sz="half" idx="2"/>
+          </p:nvPr>
+        </p:nvPicPr>
+        <p:blipFill>
+          <a:blip r:embed="rId2"/>
+          <a:stretch>
+            <a:fillRect/>
+          </a:stretch>
+        </p:blipFill>
+        <p:spPr>
+          <a:xfrm>
+            <a:off x="1232909" y="2505075"/>
+            <a:ext cx="4371544" cy="3684588"/>
+          </a:xfrm>
+          <a:prstGeom prst="rect">
+            <a:avLst/>
+          </a:prstGeom>
+        </p:spPr>
+      </p:pic>
+      <p:sp>
+        <p:nvSpPr>
+          <p:cNvPr id="5" name="Text Placeholder 4">
+            <a:extLst>
+              <a:ext uri="{FF2B5EF4-FFF2-40B4-BE49-F238E27FC236}">
+                <a16:creationId xmlns:a16="http://schemas.microsoft.com/office/drawing/2014/main" id="{9AB1B358-8F44-4778-9778-C8250A605804}"/>
+              </a:ext>
+            </a:extLst>
+          </p:cNvPr>
+          <p:cNvSpPr>
+            <a:spLocks noGrp="1"/>
+          </p:cNvSpPr>
+          <p:nvPr>
+            <p:ph type="body" sz="quarter" idx="3"/>
+          </p:nvPr>
+        </p:nvSpPr>
+        <p:spPr/>
+        <p:txBody>
+          <a:bodyPr/>
+          <a:lstStyle/>
+          <a:p>
+            <a:r>
+              <a:rPr lang="en-US"/>
+              <a:t>Mean trace, all cells</a:t>
+            </a:r>
+          </a:p>
+        </p:txBody>
+      </p:sp>
+      <p:pic>
+        <p:nvPicPr>
+          <p:cNvPr id="7" name="Content Placeholder 6">
+            <a:extLst>
+              <a:ext uri="{FF2B5EF4-FFF2-40B4-BE49-F238E27FC236}">
+                <a16:creationId xmlns:a16="http://schemas.microsoft.com/office/drawing/2014/main" id="{83DEF7B6-AB25-4D65-B0A9-37F754A0B329}"/>
+              </a:ext>
+            </a:extLst>
+          </p:cNvPr>
+          <p:cNvPicPr>
+            <a:picLocks noGrp="1" noChangeAspect="1"/>
+          </p:cNvPicPr>
+          <p:nvPr>
+            <p:ph sz="quarter" idx="4"/>
+          </p:nvPr>
+        </p:nvPicPr>
+        <p:blipFill>
+          <a:blip r:embed="rId3"/>
+          <a:stretch>
+            <a:fillRect/>
+          </a:stretch>
+        </p:blipFill>
+        <p:spPr>
+          <a:xfrm>
+            <a:off x="6578022" y="2505075"/>
+            <a:ext cx="4371544" cy="3684588"/>
+          </a:xfrm>
+          <a:prstGeom prst="rect">
+            <a:avLst/>
+          </a:prstGeom>
+        </p:spPr>
+      </p:pic>
+    </p:spTree>
+    <p:extLst>
+      <p:ext uri="{BB962C8B-B14F-4D97-AF65-F5344CB8AC3E}">
+        <p14:creationId xmlns:p14="http://schemas.microsoft.com/office/powerpoint/2010/main" val="2599329258"/>
+      </p:ext>
+    </p:extLst>
+  </p:cSld>
+  <p:clrMapOvr>
+    <a:masterClrMapping/>
+  </p:clrMapOvr>
+</p:sld>
+</file>
+
+<file path=ppt/slides/slide9.xml><?xml version="1.0" encoding="utf-8"?>
+<p:sld xmlns:a="http://schemas.openxmlformats.org/drawingml/2006/main" xmlns:r="http://schemas.openxmlformats.org/officeDocument/2006/relationships" xmlns:p="http://schemas.openxmlformats.org/presentationml/2006/main">
+  <p:cSld>
+    <p:spTree>
+      <p:nvGrpSpPr>
+        <p:cNvPr id="1" name=""/>
+        <p:cNvGrpSpPr/>
+        <p:nvPr/>
+      </p:nvGrpSpPr>
+      <p:grpSpPr>
+        <a:xfrm>
+          <a:off x="0" y="0"/>
+          <a:ext cx="0" cy="0"/>
+          <a:chOff x="0" y="0"/>
+          <a:chExt cx="0" cy="0"/>
+        </a:xfrm>
+      </p:grpSpPr>
+      <p:sp>
+        <p:nvSpPr>
+          <p:cNvPr id="2" name="Title 1">
+            <a:extLst>
+              <a:ext uri="{FF2B5EF4-FFF2-40B4-BE49-F238E27FC236}">
+                <a16:creationId xmlns:a16="http://schemas.microsoft.com/office/drawing/2014/main" id="{EA07304E-9DB6-4BB8-A612-9554251D5D44}"/>
+              </a:ext>
+            </a:extLst>
+          </p:cNvPr>
+          <p:cNvSpPr>
+            <a:spLocks noGrp="1"/>
+          </p:cNvSpPr>
+          <p:nvPr>
+            <p:ph type="title"/>
+          </p:nvPr>
+        </p:nvSpPr>
+        <p:spPr/>
+        <p:txBody>
+          <a:bodyPr/>
+          <a:lstStyle/>
+          <a:p>
+            <a:r>
+              <a:rPr lang="en-US"/>
+              <a:t>trials when stim2 ori = 90</a:t>
+            </a:r>
+          </a:p>
+        </p:txBody>
+      </p:sp>
+      <p:sp>
+        <p:nvSpPr>
+          <p:cNvPr id="3" name="Text Placeholder 2">
+            <a:extLst>
+              <a:ext uri="{FF2B5EF4-FFF2-40B4-BE49-F238E27FC236}">
+                <a16:creationId xmlns:a16="http://schemas.microsoft.com/office/drawing/2014/main" id="{D033995E-F83E-415E-B063-5BE49C79743E}"/>
+              </a:ext>
+            </a:extLst>
+          </p:cNvPr>
+          <p:cNvSpPr>
+            <a:spLocks noGrp="1"/>
+          </p:cNvSpPr>
+          <p:nvPr>
+            <p:ph type="body" idx="1"/>
+          </p:nvPr>
+        </p:nvSpPr>
+        <p:spPr/>
+        <p:txBody>
+          <a:bodyPr/>
+          <a:lstStyle/>
+          <a:p>
+            <a:r>
+              <a:rPr lang="en-US"/>
+              <a:t>Median trace, 90-deg preferring cells</a:t>
+            </a:r>
+          </a:p>
+        </p:txBody>
+      </p:sp>
+      <p:pic>
+        <p:nvPicPr>
+          <p:cNvPr id="8" name="Content Placeholder 7">
+            <a:extLst>
+              <a:ext uri="{FF2B5EF4-FFF2-40B4-BE49-F238E27FC236}">
+                <a16:creationId xmlns:a16="http://schemas.microsoft.com/office/drawing/2014/main" id="{48440EE1-A2D2-47BD-BAF7-E3C763BD7C66}"/>
+              </a:ext>
+            </a:extLst>
+          </p:cNvPr>
+          <p:cNvPicPr>
+            <a:picLocks noGrp="1" noChangeAspect="1"/>
+          </p:cNvPicPr>
+          <p:nvPr>
+            <p:ph sz="half" idx="2"/>
+          </p:nvPr>
+        </p:nvPicPr>
+        <p:blipFill>
+          <a:blip r:embed="rId2"/>
+          <a:stretch>
+            <a:fillRect/>
+          </a:stretch>
+        </p:blipFill>
+        <p:spPr>
+          <a:xfrm>
+            <a:off x="1232909" y="2505075"/>
+            <a:ext cx="4371544" cy="3684588"/>
+          </a:xfrm>
+          <a:prstGeom prst="rect">
+            <a:avLst/>
+          </a:prstGeom>
+        </p:spPr>
+      </p:pic>
+      <p:sp>
+        <p:nvSpPr>
+          <p:cNvPr id="5" name="Text Placeholder 4">
+            <a:extLst>
+              <a:ext uri="{FF2B5EF4-FFF2-40B4-BE49-F238E27FC236}">
+                <a16:creationId xmlns:a16="http://schemas.microsoft.com/office/drawing/2014/main" id="{5936D9D4-CEBF-4561-938E-174C402199DC}"/>
+              </a:ext>
+            </a:extLst>
+          </p:cNvPr>
+          <p:cNvSpPr>
+            <a:spLocks noGrp="1"/>
+          </p:cNvSpPr>
+          <p:nvPr>
+            <p:ph type="body" sz="quarter" idx="3"/>
+          </p:nvPr>
+        </p:nvSpPr>
+        <p:spPr/>
+        <p:txBody>
+          <a:bodyPr/>
+          <a:lstStyle/>
+          <a:p>
+            <a:r>
+              <a:rPr lang="en-US"/>
+              <a:t>Mean trace, 90-deg preferring cells</a:t>
+            </a:r>
+          </a:p>
+        </p:txBody>
+      </p:sp>
+      <p:pic>
+        <p:nvPicPr>
+          <p:cNvPr id="7" name="Content Placeholder 6">
+            <a:extLst>
+              <a:ext uri="{FF2B5EF4-FFF2-40B4-BE49-F238E27FC236}">
+                <a16:creationId xmlns:a16="http://schemas.microsoft.com/office/drawing/2014/main" id="{2391032F-8078-4611-BA54-8B40EB64760C}"/>
+              </a:ext>
+            </a:extLst>
+          </p:cNvPr>
+          <p:cNvPicPr>
+            <a:picLocks noGrp="1" noChangeAspect="1"/>
+          </p:cNvPicPr>
+          <p:nvPr>
+            <p:ph sz="quarter" idx="4"/>
+          </p:nvPr>
+        </p:nvPicPr>
+        <p:blipFill>
+          <a:blip r:embed="rId3"/>
+          <a:stretch>
+            <a:fillRect/>
+          </a:stretch>
+        </p:blipFill>
+        <p:spPr>
+          <a:xfrm>
+            <a:off x="6578022" y="2505075"/>
+            <a:ext cx="4371544" cy="3684588"/>
+          </a:xfrm>
+          <a:prstGeom prst="rect">
+            <a:avLst/>
+          </a:prstGeom>
+        </p:spPr>
+      </p:pic>
+    </p:spTree>
+    <p:extLst>
+      <p:ext uri="{BB962C8B-B14F-4D97-AF65-F5344CB8AC3E}">
+        <p14:creationId xmlns:p14="http://schemas.microsoft.com/office/powerpoint/2010/main" val="300970360"/>
+      </p:ext>
+    </p:extLst>
+  </p:cSld>
+  <p:clrMapOvr>
+    <a:masterClrMapping/>
+  </p:clrMapOvr>
+</p:sld>
+</file>
+
 <file path=ppt/theme/theme1.xml><?xml version="1.0" encoding="utf-8"?>
 <a:theme xmlns:a="http://schemas.openxmlformats.org/drawingml/2006/main" name="Office Theme">
   <a:themeElements>

</xml_diff>

<commit_message>
trace of avg trial of 90-pref cells when stim2=90
</commit_message>
<xml_diff>
--- a/results/tuning curve bias san check/TC.pptx
+++ b/results/tuning curve bias san check/TC.pptx
@@ -267,7 +267,7 @@
           <a:p>
             <a:fld id="{6E4F3E9B-FD2B-4199-9DEF-DC56ADED6631}" type="datetimeFigureOut">
               <a:rPr lang="en-US" smtClean="0"/>
-              <a:t>6/7/2023</a:t>
+              <a:t>6/9/2023</a:t>
             </a:fld>
             <a:endParaRPr lang="en-US"/>
           </a:p>
@@ -465,7 +465,7 @@
           <a:p>
             <a:fld id="{6E4F3E9B-FD2B-4199-9DEF-DC56ADED6631}" type="datetimeFigureOut">
               <a:rPr lang="en-US" smtClean="0"/>
-              <a:t>6/7/2023</a:t>
+              <a:t>6/9/2023</a:t>
             </a:fld>
             <a:endParaRPr lang="en-US"/>
           </a:p>
@@ -673,7 +673,7 @@
           <a:p>
             <a:fld id="{6E4F3E9B-FD2B-4199-9DEF-DC56ADED6631}" type="datetimeFigureOut">
               <a:rPr lang="en-US" smtClean="0"/>
-              <a:t>6/7/2023</a:t>
+              <a:t>6/9/2023</a:t>
             </a:fld>
             <a:endParaRPr lang="en-US"/>
           </a:p>
@@ -871,7 +871,7 @@
           <a:p>
             <a:fld id="{6E4F3E9B-FD2B-4199-9DEF-DC56ADED6631}" type="datetimeFigureOut">
               <a:rPr lang="en-US" smtClean="0"/>
-              <a:t>6/7/2023</a:t>
+              <a:t>6/9/2023</a:t>
             </a:fld>
             <a:endParaRPr lang="en-US"/>
           </a:p>
@@ -1146,7 +1146,7 @@
           <a:p>
             <a:fld id="{6E4F3E9B-FD2B-4199-9DEF-DC56ADED6631}" type="datetimeFigureOut">
               <a:rPr lang="en-US" smtClean="0"/>
-              <a:t>6/7/2023</a:t>
+              <a:t>6/9/2023</a:t>
             </a:fld>
             <a:endParaRPr lang="en-US"/>
           </a:p>
@@ -1411,7 +1411,7 @@
           <a:p>
             <a:fld id="{6E4F3E9B-FD2B-4199-9DEF-DC56ADED6631}" type="datetimeFigureOut">
               <a:rPr lang="en-US" smtClean="0"/>
-              <a:t>6/7/2023</a:t>
+              <a:t>6/9/2023</a:t>
             </a:fld>
             <a:endParaRPr lang="en-US"/>
           </a:p>
@@ -1823,7 +1823,7 @@
           <a:p>
             <a:fld id="{6E4F3E9B-FD2B-4199-9DEF-DC56ADED6631}" type="datetimeFigureOut">
               <a:rPr lang="en-US" smtClean="0"/>
-              <a:t>6/7/2023</a:t>
+              <a:t>6/9/2023</a:t>
             </a:fld>
             <a:endParaRPr lang="en-US"/>
           </a:p>
@@ -1964,7 +1964,7 @@
           <a:p>
             <a:fld id="{6E4F3E9B-FD2B-4199-9DEF-DC56ADED6631}" type="datetimeFigureOut">
               <a:rPr lang="en-US" smtClean="0"/>
-              <a:t>6/7/2023</a:t>
+              <a:t>6/9/2023</a:t>
             </a:fld>
             <a:endParaRPr lang="en-US"/>
           </a:p>
@@ -2077,7 +2077,7 @@
           <a:p>
             <a:fld id="{6E4F3E9B-FD2B-4199-9DEF-DC56ADED6631}" type="datetimeFigureOut">
               <a:rPr lang="en-US" smtClean="0"/>
-              <a:t>6/7/2023</a:t>
+              <a:t>6/9/2023</a:t>
             </a:fld>
             <a:endParaRPr lang="en-US"/>
           </a:p>
@@ -2388,7 +2388,7 @@
           <a:p>
             <a:fld id="{6E4F3E9B-FD2B-4199-9DEF-DC56ADED6631}" type="datetimeFigureOut">
               <a:rPr lang="en-US" smtClean="0"/>
-              <a:t>6/7/2023</a:t>
+              <a:t>6/9/2023</a:t>
             </a:fld>
             <a:endParaRPr lang="en-US"/>
           </a:p>
@@ -2676,7 +2676,7 @@
           <a:p>
             <a:fld id="{6E4F3E9B-FD2B-4199-9DEF-DC56ADED6631}" type="datetimeFigureOut">
               <a:rPr lang="en-US" smtClean="0"/>
-              <a:t>6/7/2023</a:t>
+              <a:t>6/9/2023</a:t>
             </a:fld>
             <a:endParaRPr lang="en-US"/>
           </a:p>
@@ -2917,7 +2917,7 @@
           <a:p>
             <a:fld id="{6E4F3E9B-FD2B-4199-9DEF-DC56ADED6631}" type="datetimeFigureOut">
               <a:rPr lang="en-US" smtClean="0"/>
-              <a:t>6/7/2023</a:t>
+              <a:t>6/9/2023</a:t>
             </a:fld>
             <a:endParaRPr lang="en-US"/>
           </a:p>
@@ -3445,7 +3445,7 @@
           <a:p>
             <a:r>
               <a:rPr lang="en-US"/>
-              <a:t>All cells</a:t>
+              <a:t>Cell id = 1</a:t>
             </a:r>
           </a:p>
         </p:txBody>
@@ -4493,17 +4493,45 @@
           <a:p>
             <a:r>
               <a:rPr lang="en-US"/>
-              <a:t>Median trace, all cells</a:t>
+              <a:t>Median trace, all cells (corrected)</a:t>
+            </a:r>
+          </a:p>
+        </p:txBody>
+      </p:sp>
+      <p:sp>
+        <p:nvSpPr>
+          <p:cNvPr id="5" name="Text Placeholder 4">
+            <a:extLst>
+              <a:ext uri="{FF2B5EF4-FFF2-40B4-BE49-F238E27FC236}">
+                <a16:creationId xmlns:a16="http://schemas.microsoft.com/office/drawing/2014/main" id="{9AB1B358-8F44-4778-9778-C8250A605804}"/>
+              </a:ext>
+            </a:extLst>
+          </p:cNvPr>
+          <p:cNvSpPr>
+            <a:spLocks noGrp="1"/>
+          </p:cNvSpPr>
+          <p:nvPr>
+            <p:ph type="body" sz="quarter" idx="3"/>
+          </p:nvPr>
+        </p:nvSpPr>
+        <p:spPr/>
+        <p:txBody>
+          <a:bodyPr/>
+          <a:lstStyle/>
+          <a:p>
+            <a:r>
+              <a:rPr lang="en-US"/>
+              <a:t>Mean trace, all cells (corrected)</a:t>
             </a:r>
           </a:p>
         </p:txBody>
       </p:sp>
       <p:pic>
         <p:nvPicPr>
-          <p:cNvPr id="8" name="Content Placeholder 7">
-            <a:extLst>
-              <a:ext uri="{FF2B5EF4-FFF2-40B4-BE49-F238E27FC236}">
-                <a16:creationId xmlns:a16="http://schemas.microsoft.com/office/drawing/2014/main" id="{00A4EE40-77BB-4124-9466-5D62945B02E3}"/>
+          <p:cNvPr id="12" name="Content Placeholder 11">
+            <a:extLst>
+              <a:ext uri="{FF2B5EF4-FFF2-40B4-BE49-F238E27FC236}">
+                <a16:creationId xmlns:a16="http://schemas.microsoft.com/office/drawing/2014/main" id="{C94609B3-07DD-442E-B06E-A4C83911262A}"/>
               </a:ext>
             </a:extLst>
           </p:cNvPr>
@@ -4530,40 +4558,12 @@
           </a:prstGeom>
         </p:spPr>
       </p:pic>
-      <p:sp>
-        <p:nvSpPr>
-          <p:cNvPr id="5" name="Text Placeholder 4">
-            <a:extLst>
-              <a:ext uri="{FF2B5EF4-FFF2-40B4-BE49-F238E27FC236}">
-                <a16:creationId xmlns:a16="http://schemas.microsoft.com/office/drawing/2014/main" id="{9AB1B358-8F44-4778-9778-C8250A605804}"/>
-              </a:ext>
-            </a:extLst>
-          </p:cNvPr>
-          <p:cNvSpPr>
-            <a:spLocks noGrp="1"/>
-          </p:cNvSpPr>
-          <p:nvPr>
-            <p:ph type="body" sz="quarter" idx="3"/>
-          </p:nvPr>
-        </p:nvSpPr>
-        <p:spPr/>
-        <p:txBody>
-          <a:bodyPr/>
-          <a:lstStyle/>
-          <a:p>
-            <a:r>
-              <a:rPr lang="en-US"/>
-              <a:t>Mean trace, all cells</a:t>
-            </a:r>
-          </a:p>
-        </p:txBody>
-      </p:sp>
       <p:pic>
         <p:nvPicPr>
-          <p:cNvPr id="7" name="Content Placeholder 6">
-            <a:extLst>
-              <a:ext uri="{FF2B5EF4-FFF2-40B4-BE49-F238E27FC236}">
-                <a16:creationId xmlns:a16="http://schemas.microsoft.com/office/drawing/2014/main" id="{83DEF7B6-AB25-4D65-B0A9-37F754A0B329}"/>
+          <p:cNvPr id="11" name="Content Placeholder 10">
+            <a:extLst>
+              <a:ext uri="{FF2B5EF4-FFF2-40B4-BE49-F238E27FC236}">
+                <a16:creationId xmlns:a16="http://schemas.microsoft.com/office/drawing/2014/main" id="{C0E6CA32-2DFE-459A-B9AC-364F0C363861}"/>
               </a:ext>
             </a:extLst>
           </p:cNvPr>

</xml_diff>

<commit_message>
plot off-on-off for baselining, weird dip before stim onset for mean but not median trace
</commit_message>
<xml_diff>
--- a/results/tuning curve bias san check/TC.pptx
+++ b/results/tuning curve bias san check/TC.pptx
@@ -14,6 +14,7 @@
     <p:sldId id="260" r:id="rId8"/>
     <p:sldId id="261" r:id="rId9"/>
     <p:sldId id="264" r:id="rId10"/>
+    <p:sldId id="265" r:id="rId11"/>
   </p:sldIdLst>
   <p:sldSz cx="12192000" cy="6858000"/>
   <p:notesSz cx="6858000" cy="9144000"/>
@@ -267,7 +268,7 @@
           <a:p>
             <a:fld id="{6E4F3E9B-FD2B-4199-9DEF-DC56ADED6631}" type="datetimeFigureOut">
               <a:rPr lang="en-US" smtClean="0"/>
-              <a:t>6/9/2023</a:t>
+              <a:t>6/12/2023</a:t>
             </a:fld>
             <a:endParaRPr lang="en-US"/>
           </a:p>
@@ -465,7 +466,7 @@
           <a:p>
             <a:fld id="{6E4F3E9B-FD2B-4199-9DEF-DC56ADED6631}" type="datetimeFigureOut">
               <a:rPr lang="en-US" smtClean="0"/>
-              <a:t>6/9/2023</a:t>
+              <a:t>6/12/2023</a:t>
             </a:fld>
             <a:endParaRPr lang="en-US"/>
           </a:p>
@@ -673,7 +674,7 @@
           <a:p>
             <a:fld id="{6E4F3E9B-FD2B-4199-9DEF-DC56ADED6631}" type="datetimeFigureOut">
               <a:rPr lang="en-US" smtClean="0"/>
-              <a:t>6/9/2023</a:t>
+              <a:t>6/12/2023</a:t>
             </a:fld>
             <a:endParaRPr lang="en-US"/>
           </a:p>
@@ -871,7 +872,7 @@
           <a:p>
             <a:fld id="{6E4F3E9B-FD2B-4199-9DEF-DC56ADED6631}" type="datetimeFigureOut">
               <a:rPr lang="en-US" smtClean="0"/>
-              <a:t>6/9/2023</a:t>
+              <a:t>6/12/2023</a:t>
             </a:fld>
             <a:endParaRPr lang="en-US"/>
           </a:p>
@@ -1146,7 +1147,7 @@
           <a:p>
             <a:fld id="{6E4F3E9B-FD2B-4199-9DEF-DC56ADED6631}" type="datetimeFigureOut">
               <a:rPr lang="en-US" smtClean="0"/>
-              <a:t>6/9/2023</a:t>
+              <a:t>6/12/2023</a:t>
             </a:fld>
             <a:endParaRPr lang="en-US"/>
           </a:p>
@@ -1411,7 +1412,7 @@
           <a:p>
             <a:fld id="{6E4F3E9B-FD2B-4199-9DEF-DC56ADED6631}" type="datetimeFigureOut">
               <a:rPr lang="en-US" smtClean="0"/>
-              <a:t>6/9/2023</a:t>
+              <a:t>6/12/2023</a:t>
             </a:fld>
             <a:endParaRPr lang="en-US"/>
           </a:p>
@@ -1823,7 +1824,7 @@
           <a:p>
             <a:fld id="{6E4F3E9B-FD2B-4199-9DEF-DC56ADED6631}" type="datetimeFigureOut">
               <a:rPr lang="en-US" smtClean="0"/>
-              <a:t>6/9/2023</a:t>
+              <a:t>6/12/2023</a:t>
             </a:fld>
             <a:endParaRPr lang="en-US"/>
           </a:p>
@@ -1964,7 +1965,7 @@
           <a:p>
             <a:fld id="{6E4F3E9B-FD2B-4199-9DEF-DC56ADED6631}" type="datetimeFigureOut">
               <a:rPr lang="en-US" smtClean="0"/>
-              <a:t>6/9/2023</a:t>
+              <a:t>6/12/2023</a:t>
             </a:fld>
             <a:endParaRPr lang="en-US"/>
           </a:p>
@@ -2077,7 +2078,7 @@
           <a:p>
             <a:fld id="{6E4F3E9B-FD2B-4199-9DEF-DC56ADED6631}" type="datetimeFigureOut">
               <a:rPr lang="en-US" smtClean="0"/>
-              <a:t>6/9/2023</a:t>
+              <a:t>6/12/2023</a:t>
             </a:fld>
             <a:endParaRPr lang="en-US"/>
           </a:p>
@@ -2388,7 +2389,7 @@
           <a:p>
             <a:fld id="{6E4F3E9B-FD2B-4199-9DEF-DC56ADED6631}" type="datetimeFigureOut">
               <a:rPr lang="en-US" smtClean="0"/>
-              <a:t>6/9/2023</a:t>
+              <a:t>6/12/2023</a:t>
             </a:fld>
             <a:endParaRPr lang="en-US"/>
           </a:p>
@@ -2676,7 +2677,7 @@
           <a:p>
             <a:fld id="{6E4F3E9B-FD2B-4199-9DEF-DC56ADED6631}" type="datetimeFigureOut">
               <a:rPr lang="en-US" smtClean="0"/>
-              <a:t>6/9/2023</a:t>
+              <a:t>6/12/2023</a:t>
             </a:fld>
             <a:endParaRPr lang="en-US"/>
           </a:p>
@@ -2917,7 +2918,7 @@
           <a:p>
             <a:fld id="{6E4F3E9B-FD2B-4199-9DEF-DC56ADED6631}" type="datetimeFigureOut">
               <a:rPr lang="en-US" smtClean="0"/>
-              <a:t>6/9/2023</a:t>
+              <a:t>6/12/2023</a:t>
             </a:fld>
             <a:endParaRPr lang="en-US"/>
           </a:p>
@@ -3486,6 +3487,184 @@
     <p:extLst>
       <p:ext uri="{BB962C8B-B14F-4D97-AF65-F5344CB8AC3E}">
         <p14:creationId xmlns:p14="http://schemas.microsoft.com/office/powerpoint/2010/main" val="3048477522"/>
+      </p:ext>
+    </p:extLst>
+  </p:cSld>
+  <p:clrMapOvr>
+    <a:masterClrMapping/>
+  </p:clrMapOvr>
+</p:sld>
+</file>
+
+<file path=ppt/slides/slide10.xml><?xml version="1.0" encoding="utf-8"?>
+<p:sld xmlns:a="http://schemas.openxmlformats.org/drawingml/2006/main" xmlns:r="http://schemas.openxmlformats.org/officeDocument/2006/relationships" xmlns:p="http://schemas.openxmlformats.org/presentationml/2006/main">
+  <p:cSld>
+    <p:spTree>
+      <p:nvGrpSpPr>
+        <p:cNvPr id="1" name=""/>
+        <p:cNvGrpSpPr/>
+        <p:nvPr/>
+      </p:nvGrpSpPr>
+      <p:grpSpPr>
+        <a:xfrm>
+          <a:off x="0" y="0"/>
+          <a:ext cx="0" cy="0"/>
+          <a:chOff x="0" y="0"/>
+          <a:chExt cx="0" cy="0"/>
+        </a:xfrm>
+      </p:grpSpPr>
+      <p:sp>
+        <p:nvSpPr>
+          <p:cNvPr id="2" name="Title 1">
+            <a:extLst>
+              <a:ext uri="{FF2B5EF4-FFF2-40B4-BE49-F238E27FC236}">
+                <a16:creationId xmlns:a16="http://schemas.microsoft.com/office/drawing/2014/main" id="{284722A7-FABC-42C0-A054-B3F66F8A78A1}"/>
+              </a:ext>
+            </a:extLst>
+          </p:cNvPr>
+          <p:cNvSpPr>
+            <a:spLocks noGrp="1"/>
+          </p:cNvSpPr>
+          <p:nvPr>
+            <p:ph type="title"/>
+          </p:nvPr>
+        </p:nvSpPr>
+        <p:spPr/>
+        <p:txBody>
+          <a:bodyPr/>
+          <a:lstStyle/>
+          <a:p>
+            <a:r>
+              <a:rPr lang="en-US"/>
+              <a:t>df/f baselining</a:t>
+            </a:r>
+          </a:p>
+        </p:txBody>
+      </p:sp>
+      <p:sp>
+        <p:nvSpPr>
+          <p:cNvPr id="3" name="Text Placeholder 2">
+            <a:extLst>
+              <a:ext uri="{FF2B5EF4-FFF2-40B4-BE49-F238E27FC236}">
+                <a16:creationId xmlns:a16="http://schemas.microsoft.com/office/drawing/2014/main" id="{70B96722-BA26-4D19-93A1-563D40B42BF0}"/>
+              </a:ext>
+            </a:extLst>
+          </p:cNvPr>
+          <p:cNvSpPr>
+            <a:spLocks noGrp="1"/>
+          </p:cNvSpPr>
+          <p:nvPr>
+            <p:ph type="body" idx="1"/>
+          </p:nvPr>
+        </p:nvSpPr>
+        <p:spPr/>
+        <p:txBody>
+          <a:bodyPr/>
+          <a:lstStyle/>
+          <a:p>
+            <a:r>
+              <a:rPr lang="en-US"/>
+              <a:t>Mean trace, ITI/2 first</a:t>
+            </a:r>
+          </a:p>
+        </p:txBody>
+      </p:sp>
+      <p:pic>
+        <p:nvPicPr>
+          <p:cNvPr id="8" name="Content Placeholder 7">
+            <a:extLst>
+              <a:ext uri="{FF2B5EF4-FFF2-40B4-BE49-F238E27FC236}">
+                <a16:creationId xmlns:a16="http://schemas.microsoft.com/office/drawing/2014/main" id="{2C136695-8948-4B99-AA9C-A793AC87E03D}"/>
+              </a:ext>
+            </a:extLst>
+          </p:cNvPr>
+          <p:cNvPicPr>
+            <a:picLocks noGrp="1" noChangeAspect="1"/>
+          </p:cNvPicPr>
+          <p:nvPr>
+            <p:ph sz="half" idx="2"/>
+          </p:nvPr>
+        </p:nvPicPr>
+        <p:blipFill>
+          <a:blip r:embed="rId2"/>
+          <a:stretch>
+            <a:fillRect/>
+          </a:stretch>
+        </p:blipFill>
+        <p:spPr>
+          <a:xfrm>
+            <a:off x="1232909" y="2505075"/>
+            <a:ext cx="4371544" cy="3684588"/>
+          </a:xfrm>
+          <a:prstGeom prst="rect">
+            <a:avLst/>
+          </a:prstGeom>
+        </p:spPr>
+      </p:pic>
+      <p:sp>
+        <p:nvSpPr>
+          <p:cNvPr id="5" name="Text Placeholder 4">
+            <a:extLst>
+              <a:ext uri="{FF2B5EF4-FFF2-40B4-BE49-F238E27FC236}">
+                <a16:creationId xmlns:a16="http://schemas.microsoft.com/office/drawing/2014/main" id="{ADB35958-B5E3-4FCE-973C-E756ADD39220}"/>
+              </a:ext>
+            </a:extLst>
+          </p:cNvPr>
+          <p:cNvSpPr>
+            <a:spLocks noGrp="1"/>
+          </p:cNvSpPr>
+          <p:nvPr>
+            <p:ph type="body" sz="quarter" idx="3"/>
+          </p:nvPr>
+        </p:nvSpPr>
+        <p:spPr/>
+        <p:txBody>
+          <a:bodyPr/>
+          <a:lstStyle/>
+          <a:p>
+            <a:r>
+              <a:rPr lang="en-US"/>
+              <a:t>Median trace, ITI/2 first</a:t>
+            </a:r>
+          </a:p>
+        </p:txBody>
+      </p:sp>
+      <p:pic>
+        <p:nvPicPr>
+          <p:cNvPr id="9" name="Content Placeholder 8">
+            <a:extLst>
+              <a:ext uri="{FF2B5EF4-FFF2-40B4-BE49-F238E27FC236}">
+                <a16:creationId xmlns:a16="http://schemas.microsoft.com/office/drawing/2014/main" id="{CCF0BFF3-649F-4400-95B1-516DFF24D4A6}"/>
+              </a:ext>
+            </a:extLst>
+          </p:cNvPr>
+          <p:cNvPicPr>
+            <a:picLocks noGrp="1" noChangeAspect="1"/>
+          </p:cNvPicPr>
+          <p:nvPr>
+            <p:ph sz="quarter" idx="4"/>
+          </p:nvPr>
+        </p:nvPicPr>
+        <p:blipFill>
+          <a:blip r:embed="rId3"/>
+          <a:stretch>
+            <a:fillRect/>
+          </a:stretch>
+        </p:blipFill>
+        <p:spPr>
+          <a:xfrm>
+            <a:off x="6578022" y="2505075"/>
+            <a:ext cx="4371544" cy="3684588"/>
+          </a:xfrm>
+          <a:prstGeom prst="rect">
+            <a:avLst/>
+          </a:prstGeom>
+        </p:spPr>
+      </p:pic>
+    </p:spTree>
+    <p:extLst>
+      <p:ext uri="{BB962C8B-B14F-4D97-AF65-F5344CB8AC3E}">
+        <p14:creationId xmlns:p14="http://schemas.microsoft.com/office/powerpoint/2010/main" val="3781321028"/>
       </p:ext>
     </p:extLst>
   </p:cSld>

</xml_diff>